<commit_message>
[add] 2019-01-11 Study Socket
</commit_message>
<xml_diff>
--- a/TheorySeminar/16. Detail Mission.pptx
+++ b/TheorySeminar/16. Detail Mission.pptx
@@ -3915,12 +3915,8 @@
               <a:buChar char="•"/>
             </a:pPr>
             <a:r>
-              <a:rPr lang="ko-KR" altLang="en-US"/>
-              <a:t>년도를 선택하면 </a:t>
-            </a:r>
-            <a:r>
               <a:rPr lang="ko-KR" altLang="en-US" dirty="0"/>
-              <a:t>해당 년도의 휴일을 모두 보여주기</a:t>
+              <a:t>년도를 선택하면 해당 년도의 휴일을 모두 보여주기</a:t>
             </a:r>
             <a:endParaRPr lang="en-US" altLang="ko-KR" dirty="0"/>
           </a:p>
@@ -4107,7 +4103,7 @@
         </p:nvSpPr>
         <p:spPr>
           <a:xfrm>
-            <a:off x="1711569" y="1139629"/>
+            <a:off x="1652954" y="1103140"/>
             <a:ext cx="8718442" cy="1745568"/>
           </a:xfrm>
           <a:prstGeom prst="rect">
@@ -4216,6 +4212,59 @@
                       </p:childTnLst>
                     </p:cTn>
                   </p:par>
+                  <p:par>
+                    <p:cTn id="8" fill="hold">
+                      <p:stCondLst>
+                        <p:cond delay="indefinite"/>
+                      </p:stCondLst>
+                      <p:childTnLst>
+                        <p:par>
+                          <p:cTn id="9" fill="hold">
+                            <p:stCondLst>
+                              <p:cond delay="0"/>
+                            </p:stCondLst>
+                            <p:childTnLst>
+                              <p:par>
+                                <p:cTn id="10" presetID="10" presetClass="entr" presetSubtype="0" fill="hold" grpId="0" nodeType="clickEffect">
+                                  <p:stCondLst>
+                                    <p:cond delay="0"/>
+                                  </p:stCondLst>
+                                  <p:childTnLst>
+                                    <p:set>
+                                      <p:cBhvr>
+                                        <p:cTn id="11" dur="1" fill="hold">
+                                          <p:stCondLst>
+                                            <p:cond delay="0"/>
+                                          </p:stCondLst>
+                                        </p:cTn>
+                                        <p:tgtEl>
+                                          <p:spTgt spid="3"/>
+                                        </p:tgtEl>
+                                        <p:attrNameLst>
+                                          <p:attrName>style.visibility</p:attrName>
+                                        </p:attrNameLst>
+                                      </p:cBhvr>
+                                      <p:to>
+                                        <p:strVal val="visible"/>
+                                      </p:to>
+                                    </p:set>
+                                    <p:animEffect transition="in" filter="fade">
+                                      <p:cBhvr>
+                                        <p:cTn id="12" dur="500"/>
+                                        <p:tgtEl>
+                                          <p:spTgt spid="3"/>
+                                        </p:tgtEl>
+                                      </p:cBhvr>
+                                    </p:animEffect>
+                                  </p:childTnLst>
+                                </p:cTn>
+                              </p:par>
+                            </p:childTnLst>
+                          </p:cTn>
+                        </p:par>
+                      </p:childTnLst>
+                    </p:cTn>
+                  </p:par>
                 </p:childTnLst>
               </p:cTn>
               <p:prevCondLst>
@@ -4239,6 +4288,7 @@
     </p:tnLst>
     <p:bldLst>
       <p:bldP spid="2" grpId="0"/>
+      <p:bldP spid="3" grpId="0" animBg="1"/>
     </p:bldLst>
   </p:timing>
 </p:sld>

</xml_diff>

<commit_message>
[add] Hamming code with C
</commit_message>
<xml_diff>
--- a/TheorySeminar/16. Detail Mission.pptx
+++ b/TheorySeminar/16. Detail Mission.pptx
@@ -198,7 +198,7 @@
           <a:p>
             <a:fld id="{8DD9E706-E0BA-4FBD-AF15-9E3682821587}" type="datetimeFigureOut">
               <a:rPr lang="ko-KR" altLang="en-US" smtClean="0"/>
-              <a:t>2019-01-10</a:t>
+              <a:t>2019-01-15</a:t>
             </a:fld>
             <a:endParaRPr lang="ko-KR" altLang="en-US"/>
           </a:p>
@@ -775,7 +775,7 @@
           <a:p>
             <a:fld id="{46A2558D-9475-4DD4-8F32-96381613298F}" type="datetimeFigureOut">
               <a:rPr lang="ko-KR" altLang="en-US" smtClean="0"/>
-              <a:t>2019-01-10</a:t>
+              <a:t>2019-01-15</a:t>
             </a:fld>
             <a:endParaRPr lang="ko-KR" altLang="en-US"/>
           </a:p>
@@ -945,7 +945,7 @@
           <a:p>
             <a:fld id="{46A2558D-9475-4DD4-8F32-96381613298F}" type="datetimeFigureOut">
               <a:rPr lang="ko-KR" altLang="en-US" smtClean="0"/>
-              <a:t>2019-01-10</a:t>
+              <a:t>2019-01-15</a:t>
             </a:fld>
             <a:endParaRPr lang="ko-KR" altLang="en-US"/>
           </a:p>
@@ -1125,7 +1125,7 @@
           <a:p>
             <a:fld id="{46A2558D-9475-4DD4-8F32-96381613298F}" type="datetimeFigureOut">
               <a:rPr lang="ko-KR" altLang="en-US" smtClean="0"/>
-              <a:t>2019-01-10</a:t>
+              <a:t>2019-01-15</a:t>
             </a:fld>
             <a:endParaRPr lang="ko-KR" altLang="en-US"/>
           </a:p>
@@ -1295,7 +1295,7 @@
           <a:p>
             <a:fld id="{46A2558D-9475-4DD4-8F32-96381613298F}" type="datetimeFigureOut">
               <a:rPr lang="ko-KR" altLang="en-US" smtClean="0"/>
-              <a:t>2019-01-10</a:t>
+              <a:t>2019-01-15</a:t>
             </a:fld>
             <a:endParaRPr lang="ko-KR" altLang="en-US"/>
           </a:p>
@@ -1541,7 +1541,7 @@
           <a:p>
             <a:fld id="{46A2558D-9475-4DD4-8F32-96381613298F}" type="datetimeFigureOut">
               <a:rPr lang="ko-KR" altLang="en-US" smtClean="0"/>
-              <a:t>2019-01-10</a:t>
+              <a:t>2019-01-15</a:t>
             </a:fld>
             <a:endParaRPr lang="ko-KR" altLang="en-US"/>
           </a:p>
@@ -1773,7 +1773,7 @@
           <a:p>
             <a:fld id="{46A2558D-9475-4DD4-8F32-96381613298F}" type="datetimeFigureOut">
               <a:rPr lang="ko-KR" altLang="en-US" smtClean="0"/>
-              <a:t>2019-01-10</a:t>
+              <a:t>2019-01-15</a:t>
             </a:fld>
             <a:endParaRPr lang="ko-KR" altLang="en-US"/>
           </a:p>
@@ -2140,7 +2140,7 @@
           <a:p>
             <a:fld id="{46A2558D-9475-4DD4-8F32-96381613298F}" type="datetimeFigureOut">
               <a:rPr lang="ko-KR" altLang="en-US" smtClean="0"/>
-              <a:t>2019-01-10</a:t>
+              <a:t>2019-01-15</a:t>
             </a:fld>
             <a:endParaRPr lang="ko-KR" altLang="en-US"/>
           </a:p>
@@ -2258,7 +2258,7 @@
           <a:p>
             <a:fld id="{46A2558D-9475-4DD4-8F32-96381613298F}" type="datetimeFigureOut">
               <a:rPr lang="ko-KR" altLang="en-US" smtClean="0"/>
-              <a:t>2019-01-10</a:t>
+              <a:t>2019-01-15</a:t>
             </a:fld>
             <a:endParaRPr lang="ko-KR" altLang="en-US"/>
           </a:p>
@@ -2353,7 +2353,7 @@
           <a:p>
             <a:fld id="{46A2558D-9475-4DD4-8F32-96381613298F}" type="datetimeFigureOut">
               <a:rPr lang="ko-KR" altLang="en-US" smtClean="0"/>
-              <a:t>2019-01-10</a:t>
+              <a:t>2019-01-15</a:t>
             </a:fld>
             <a:endParaRPr lang="ko-KR" altLang="en-US"/>
           </a:p>
@@ -2630,7 +2630,7 @@
           <a:p>
             <a:fld id="{46A2558D-9475-4DD4-8F32-96381613298F}" type="datetimeFigureOut">
               <a:rPr lang="ko-KR" altLang="en-US" smtClean="0"/>
-              <a:t>2019-01-10</a:t>
+              <a:t>2019-01-15</a:t>
             </a:fld>
             <a:endParaRPr lang="ko-KR" altLang="en-US"/>
           </a:p>
@@ -2887,7 +2887,7 @@
           <a:p>
             <a:fld id="{46A2558D-9475-4DD4-8F32-96381613298F}" type="datetimeFigureOut">
               <a:rPr lang="ko-KR" altLang="en-US" smtClean="0"/>
-              <a:t>2019-01-10</a:t>
+              <a:t>2019-01-15</a:t>
             </a:fld>
             <a:endParaRPr lang="ko-KR" altLang="en-US"/>
           </a:p>
@@ -3100,7 +3100,7 @@
           <a:p>
             <a:fld id="{46A2558D-9475-4DD4-8F32-96381613298F}" type="datetimeFigureOut">
               <a:rPr lang="ko-KR" altLang="en-US" smtClean="0"/>
-              <a:t>2019-01-10</a:t>
+              <a:t>2019-01-15</a:t>
             </a:fld>
             <a:endParaRPr lang="ko-KR" altLang="en-US"/>
           </a:p>
@@ -3767,7 +3767,7 @@
         <p:spPr>
           <a:xfrm>
             <a:off x="1761989" y="1103140"/>
-            <a:ext cx="9268287" cy="5035353"/>
+            <a:ext cx="9268287" cy="5450851"/>
           </a:xfrm>
           <a:prstGeom prst="rect">
             <a:avLst/>
@@ -3779,6 +3779,275 @@
             <a:spAutoFit/>
           </a:bodyPr>
           <a:lstStyle/>
+          <a:p>
+            <a:pPr marL="285750" indent="-285750">
+              <a:lnSpc>
+                <a:spcPct val="150000"/>
+              </a:lnSpc>
+              <a:buClr>
+                <a:srgbClr val="00B050"/>
+              </a:buClr>
+              <a:buFont typeface="Wingdings" panose="05000000000000000000" pitchFamily="2" charset="2"/>
+              <a:buChar char="ü"/>
+            </a:pPr>
+            <a:r>
+              <a:rPr lang="en-US" altLang="ko-KR" dirty="0"/>
+              <a:t>PHP</a:t>
+            </a:r>
+            <a:r>
+              <a:rPr lang="ko-KR" altLang="en-US" dirty="0"/>
+              <a:t>에서 </a:t>
+            </a:r>
+            <a:r>
+              <a:rPr lang="en-US" altLang="ko-KR" dirty="0"/>
+              <a:t>Composer</a:t>
+            </a:r>
+            <a:r>
+              <a:rPr lang="ko-KR" altLang="en-US" dirty="0"/>
+              <a:t>를 이용하여 </a:t>
+            </a:r>
+            <a:r>
+              <a:rPr lang="en-US" altLang="ko-KR" dirty="0"/>
+              <a:t>twig</a:t>
+            </a:r>
+            <a:r>
+              <a:rPr lang="ko-KR" altLang="en-US" dirty="0"/>
+              <a:t>을 구성하고 템플릿 상속을 구현</a:t>
+            </a:r>
+            <a:r>
+              <a:rPr lang="en-US" altLang="ko-KR" dirty="0"/>
+              <a:t>, </a:t>
+            </a:r>
+            <a:r>
+              <a:rPr lang="ko-KR" altLang="en-US" dirty="0"/>
+              <a:t>설명한다</a:t>
+            </a:r>
+            <a:r>
+              <a:rPr lang="en-US" altLang="ko-KR" dirty="0"/>
+              <a:t>.</a:t>
+            </a:r>
+          </a:p>
+          <a:p>
+            <a:pPr marL="285750" indent="-285750">
+              <a:lnSpc>
+                <a:spcPct val="150000"/>
+              </a:lnSpc>
+              <a:buClr>
+                <a:srgbClr val="00B050"/>
+              </a:buClr>
+              <a:buFont typeface="Wingdings" panose="05000000000000000000" pitchFamily="2" charset="2"/>
+              <a:buChar char="ü"/>
+            </a:pPr>
+            <a:r>
+              <a:rPr lang="en-US" altLang="ko-KR" dirty="0"/>
+              <a:t>PHP Faker</a:t>
+            </a:r>
+            <a:r>
+              <a:rPr lang="ko-KR" altLang="en-US" dirty="0"/>
+              <a:t>를 이용하여 </a:t>
+            </a:r>
+            <a:r>
+              <a:rPr lang="en-US" altLang="ko-KR" dirty="0"/>
+              <a:t>10</a:t>
+            </a:r>
+            <a:r>
+              <a:rPr lang="ko-KR" altLang="en-US" dirty="0"/>
+              <a:t>만개의 가상 데이터를 만들어라</a:t>
+            </a:r>
+            <a:r>
+              <a:rPr lang="en-US" altLang="ko-KR" dirty="0"/>
+              <a:t>.</a:t>
+            </a:r>
+          </a:p>
+          <a:p>
+            <a:pPr marL="285750" indent="-285750">
+              <a:lnSpc>
+                <a:spcPct val="150000"/>
+              </a:lnSpc>
+              <a:buClr>
+                <a:srgbClr val="00B050"/>
+              </a:buClr>
+              <a:buFont typeface="Wingdings" panose="05000000000000000000" pitchFamily="2" charset="2"/>
+              <a:buChar char="ü"/>
+            </a:pPr>
+            <a:r>
+              <a:rPr lang="en-US" altLang="ko-KR" dirty="0"/>
+              <a:t>PHP </a:t>
+            </a:r>
+            <a:r>
+              <a:rPr lang="ko-KR" altLang="en-US" dirty="0"/>
+              <a:t>템플릿 엔진인 </a:t>
+            </a:r>
+            <a:r>
+              <a:rPr lang="en-US" altLang="ko-KR" dirty="0"/>
+              <a:t>Smarty</a:t>
+            </a:r>
+            <a:r>
+              <a:rPr lang="ko-KR" altLang="en-US" dirty="0"/>
+              <a:t>를 이용하여 </a:t>
+            </a:r>
+            <a:r>
+              <a:rPr lang="en-US" altLang="ko-KR" dirty="0"/>
+              <a:t>block</a:t>
+            </a:r>
+            <a:r>
+              <a:rPr lang="ko-KR" altLang="en-US" dirty="0"/>
+              <a:t>과 레이아웃을 분리하라</a:t>
+            </a:r>
+            <a:r>
+              <a:rPr lang="en-US" altLang="ko-KR" dirty="0"/>
+              <a:t>(*.</a:t>
+            </a:r>
+            <a:r>
+              <a:rPr lang="en-US" altLang="ko-KR" dirty="0" err="1"/>
+              <a:t>tpl</a:t>
+            </a:r>
+            <a:r>
+              <a:rPr lang="en-US" altLang="ko-KR" dirty="0"/>
+              <a:t> </a:t>
+            </a:r>
+            <a:r>
+              <a:rPr lang="ko-KR" altLang="en-US" dirty="0"/>
+              <a:t>사용</a:t>
+            </a:r>
+            <a:r>
+              <a:rPr lang="en-US" altLang="ko-KR" dirty="0"/>
+              <a:t>)</a:t>
+            </a:r>
+          </a:p>
+          <a:p>
+            <a:pPr marL="285750" indent="-285750">
+              <a:lnSpc>
+                <a:spcPct val="150000"/>
+              </a:lnSpc>
+              <a:buClr>
+                <a:srgbClr val="00B050"/>
+              </a:buClr>
+              <a:buFont typeface="Wingdings" panose="05000000000000000000" pitchFamily="2" charset="2"/>
+              <a:buChar char="ü"/>
+            </a:pPr>
+            <a:r>
+              <a:rPr lang="ko-KR" altLang="en-US" dirty="0"/>
+              <a:t>년도를 선택하면 해당 년도의 휴일을 모두 보여주기</a:t>
+            </a:r>
+            <a:endParaRPr lang="en-US" altLang="ko-KR" dirty="0"/>
+          </a:p>
+          <a:p>
+            <a:pPr marL="285750" indent="-285750">
+              <a:lnSpc>
+                <a:spcPct val="150000"/>
+              </a:lnSpc>
+              <a:buClr>
+                <a:srgbClr val="FF0000"/>
+              </a:buClr>
+              <a:buFont typeface="Wingdings" panose="05000000000000000000" pitchFamily="2" charset="2"/>
+              <a:buChar char="ü"/>
+            </a:pPr>
+            <a:r>
+              <a:rPr lang="en-US" altLang="ko-KR" dirty="0"/>
+              <a:t>PHP</a:t>
+            </a:r>
+            <a:r>
+              <a:rPr lang="ko-KR" altLang="en-US" dirty="0"/>
+              <a:t>의 다양한 템플릿 엔진에 대한 조사 및 세미나</a:t>
+            </a:r>
+            <a:r>
+              <a:rPr lang="en-US" altLang="ko-KR" dirty="0"/>
+              <a:t> (5</a:t>
+            </a:r>
+            <a:r>
+              <a:rPr lang="ko-KR" altLang="en-US" dirty="0"/>
+              <a:t>개 이상</a:t>
+            </a:r>
+            <a:r>
+              <a:rPr lang="en-US" altLang="ko-KR" dirty="0"/>
+              <a:t>)</a:t>
+            </a:r>
+          </a:p>
+          <a:p>
+            <a:pPr marL="285750" indent="-285750">
+              <a:lnSpc>
+                <a:spcPct val="150000"/>
+              </a:lnSpc>
+              <a:buClr>
+                <a:srgbClr val="FF0000"/>
+              </a:buClr>
+              <a:buFont typeface="Wingdings" panose="05000000000000000000" pitchFamily="2" charset="2"/>
+              <a:buChar char="ü"/>
+            </a:pPr>
+            <a:r>
+              <a:rPr lang="ko-KR" altLang="en-US" dirty="0"/>
+              <a:t>표준 </a:t>
+            </a:r>
+            <a:r>
+              <a:rPr lang="en-US" altLang="ko-KR" dirty="0"/>
+              <a:t>C/C++ </a:t>
+            </a:r>
+            <a:r>
+              <a:rPr lang="ko-KR" altLang="en-US" dirty="0"/>
+              <a:t>코드를 웹페이지에서 편집하고 저장 후 빌드 및 실행한 다음 결과값이 웹페이지에 출력되도록 하라</a:t>
+            </a:r>
+            <a:r>
+              <a:rPr lang="en-US" altLang="ko-KR" dirty="0"/>
+              <a:t>.</a:t>
+            </a:r>
+          </a:p>
+          <a:p>
+            <a:pPr marL="285750" indent="-285750">
+              <a:lnSpc>
+                <a:spcPct val="150000"/>
+              </a:lnSpc>
+              <a:buClr>
+                <a:srgbClr val="FF0000"/>
+              </a:buClr>
+              <a:buFont typeface="Wingdings" panose="05000000000000000000" pitchFamily="2" charset="2"/>
+              <a:buChar char="ü"/>
+            </a:pPr>
+            <a:r>
+              <a:rPr lang="en-US" altLang="ko-KR" dirty="0" err="1"/>
+              <a:t>Ffmpeg</a:t>
+            </a:r>
+            <a:r>
+              <a:rPr lang="ko-KR" altLang="en-US" dirty="0"/>
+              <a:t>를 이용하여 </a:t>
+            </a:r>
+            <a:r>
+              <a:rPr lang="en-US" altLang="ko-KR" dirty="0" err="1"/>
+              <a:t>VideoLan</a:t>
+            </a:r>
+            <a:r>
+              <a:rPr lang="ko-KR" altLang="en-US" dirty="0"/>
+              <a:t>으로 스트리밍이 되는 것 제작 후 세미나</a:t>
+            </a:r>
+            <a:r>
+              <a:rPr lang="en-US" altLang="ko-KR" dirty="0"/>
+              <a:t>.</a:t>
+            </a:r>
+          </a:p>
+          <a:p>
+            <a:pPr marL="285750" indent="-285750">
+              <a:lnSpc>
+                <a:spcPct val="150000"/>
+              </a:lnSpc>
+              <a:buClr>
+                <a:srgbClr val="FF0000"/>
+              </a:buClr>
+              <a:buFont typeface="Wingdings" panose="05000000000000000000" pitchFamily="2" charset="2"/>
+              <a:buChar char="ü"/>
+            </a:pPr>
+            <a:r>
+              <a:rPr lang="ko-KR" altLang="en-US" dirty="0" err="1"/>
+              <a:t>해밍코드를</a:t>
+            </a:r>
+            <a:r>
+              <a:rPr lang="ko-KR" altLang="en-US" dirty="0"/>
+              <a:t> 프로그래밍 언어로 표현하라</a:t>
+            </a:r>
+            <a:r>
+              <a:rPr lang="en-US" altLang="ko-KR" dirty="0"/>
+              <a:t>.(C/C++)</a:t>
+            </a:r>
+          </a:p>
           <a:p>
             <a:pPr marL="285750" indent="-285750">
               <a:lnSpc>
@@ -3789,40 +4058,13 @@
             </a:pPr>
             <a:r>
               <a:rPr lang="en-US" altLang="ko-KR" dirty="0"/>
-              <a:t>PHP</a:t>
-            </a:r>
-            <a:r>
-              <a:rPr lang="ko-KR" altLang="en-US" dirty="0"/>
-              <a:t>에서 </a:t>
-            </a:r>
-            <a:r>
-              <a:rPr lang="en-US" altLang="ko-KR" dirty="0"/>
-              <a:t>Composer</a:t>
-            </a:r>
-            <a:r>
-              <a:rPr lang="ko-KR" altLang="en-US" dirty="0"/>
-              <a:t>를 이용하여 </a:t>
-            </a:r>
-            <a:r>
-              <a:rPr lang="en-US" altLang="ko-KR" dirty="0"/>
-              <a:t>twig</a:t>
-            </a:r>
-            <a:r>
-              <a:rPr lang="ko-KR" altLang="en-US" dirty="0"/>
-              <a:t>을 구성하고 템플릿 상속을 구현</a:t>
-            </a:r>
-            <a:r>
-              <a:rPr lang="en-US" altLang="ko-KR" dirty="0"/>
-              <a:t>, </a:t>
-            </a:r>
-            <a:r>
-              <a:rPr lang="ko-KR" altLang="en-US" dirty="0"/>
-              <a:t>설명한다</a:t>
-            </a:r>
-            <a:r>
-              <a:rPr lang="en-US" altLang="ko-KR" dirty="0"/>
-              <a:t>.</a:t>
-            </a:r>
+              <a:t>Toolchain configuration boost, </a:t>
+            </a:r>
+            <a:r>
+              <a:rPr lang="en-US" altLang="ko-KR" dirty="0" err="1"/>
+              <a:t>cpp_redis</a:t>
+            </a:r>
+            <a:endParaRPr lang="en-US" altLang="ko-KR" dirty="0"/>
           </a:p>
           <a:p>
             <a:pPr marL="285750" indent="-285750">
@@ -3834,19 +4076,35 @@
             </a:pPr>
             <a:r>
               <a:rPr lang="en-US" altLang="ko-KR" dirty="0"/>
-              <a:t>PHP Faker</a:t>
+              <a:t>Client</a:t>
             </a:r>
             <a:r>
               <a:rPr lang="ko-KR" altLang="en-US" dirty="0"/>
-              <a:t>를 이용하여 </a:t>
+              <a:t>는 </a:t>
             </a:r>
             <a:r>
               <a:rPr lang="en-US" altLang="ko-KR" dirty="0"/>
-              <a:t>10</a:t>
+              <a:t>window </a:t>
             </a:r>
             <a:r>
               <a:rPr lang="ko-KR" altLang="en-US" dirty="0"/>
-              <a:t>만개의 가상 데이터를 만들어라</a:t>
+              <a:t>혹은 </a:t>
+            </a:r>
+            <a:r>
+              <a:rPr lang="en-US" altLang="ko-KR" dirty="0" err="1"/>
+              <a:t>linux</a:t>
+            </a:r>
+            <a:r>
+              <a:rPr lang="ko-KR" altLang="en-US" dirty="0"/>
+              <a:t> 콘솔 기반의 </a:t>
+            </a:r>
+            <a:r>
+              <a:rPr lang="en-US" altLang="ko-KR" dirty="0"/>
+              <a:t>C/C++</a:t>
+            </a:r>
+            <a:r>
+              <a:rPr lang="ko-KR" altLang="en-US" dirty="0"/>
+              <a:t>로 만들고 서버는 웹으로 제작하여 채팅 프로그램을 구현하라</a:t>
             </a:r>
             <a:r>
               <a:rPr lang="en-US" altLang="ko-KR" dirty="0"/>
@@ -3854,290 +4112,12 @@
             </a:r>
           </a:p>
           <a:p>
-            <a:pPr marL="285750" indent="-285750">
+            <a:pPr>
               <a:lnSpc>
                 <a:spcPct val="150000"/>
               </a:lnSpc>
-              <a:buFont typeface="Arial" panose="020B0604020202020204" pitchFamily="34" charset="0"/>
-              <a:buChar char="•"/>
             </a:pPr>
-            <a:r>
-              <a:rPr lang="en-US" altLang="ko-KR" dirty="0"/>
-              <a:t>PHP </a:t>
-            </a:r>
-            <a:r>
-              <a:rPr lang="ko-KR" altLang="en-US" dirty="0"/>
-              <a:t>템플릿 엔진인 </a:t>
-            </a:r>
-            <a:r>
-              <a:rPr lang="en-US" altLang="ko-KR" dirty="0"/>
-              <a:t>Smarty</a:t>
-            </a:r>
-            <a:r>
-              <a:rPr lang="ko-KR" altLang="en-US" dirty="0"/>
-              <a:t>를 이용하여 </a:t>
-            </a:r>
-            <a:r>
-              <a:rPr lang="en-US" altLang="ko-KR" dirty="0"/>
-              <a:t>block</a:t>
-            </a:r>
-            <a:r>
-              <a:rPr lang="ko-KR" altLang="en-US" dirty="0"/>
-              <a:t>과 레이아웃을 분리하라</a:t>
-            </a:r>
-            <a:r>
-              <a:rPr lang="en-US" altLang="ko-KR" dirty="0"/>
-              <a:t>(*.</a:t>
-            </a:r>
-            <a:r>
-              <a:rPr lang="en-US" altLang="ko-KR" dirty="0" err="1"/>
-              <a:t>tpl</a:t>
-            </a:r>
-            <a:r>
-              <a:rPr lang="en-US" altLang="ko-KR" dirty="0"/>
-              <a:t> </a:t>
-            </a:r>
-            <a:r>
-              <a:rPr lang="ko-KR" altLang="en-US" dirty="0"/>
-              <a:t>사용</a:t>
-            </a:r>
-            <a:r>
-              <a:rPr lang="en-US" altLang="ko-KR" dirty="0"/>
-              <a:t>)</a:t>
-            </a:r>
-          </a:p>
-          <a:p>
-            <a:pPr marL="285750" indent="-285750">
-              <a:lnSpc>
-                <a:spcPct val="150000"/>
-              </a:lnSpc>
-              <a:buFont typeface="Arial" panose="020B0604020202020204" pitchFamily="34" charset="0"/>
-              <a:buChar char="•"/>
-            </a:pPr>
-            <a:r>
-              <a:rPr lang="ko-KR" altLang="en-US" dirty="0"/>
-              <a:t>년도를 선택하면 해당 년도의 휴일을 모두 보여주기</a:t>
-            </a:r>
             <a:endParaRPr lang="en-US" altLang="ko-KR" dirty="0"/>
-          </a:p>
-          <a:p>
-            <a:pPr marL="285750" indent="-285750">
-              <a:lnSpc>
-                <a:spcPct val="150000"/>
-              </a:lnSpc>
-              <a:buFont typeface="Arial" panose="020B0604020202020204" pitchFamily="34" charset="0"/>
-              <a:buChar char="•"/>
-            </a:pPr>
-            <a:r>
-              <a:rPr lang="en-US" altLang="ko-KR" dirty="0"/>
-              <a:t>PHP</a:t>
-            </a:r>
-            <a:r>
-              <a:rPr lang="ko-KR" altLang="en-US" dirty="0"/>
-              <a:t>의 다양한 템플릿 엔진에 대한 조사 및 세미나</a:t>
-            </a:r>
-            <a:r>
-              <a:rPr lang="en-US" altLang="ko-KR" dirty="0"/>
-              <a:t> (5</a:t>
-            </a:r>
-            <a:r>
-              <a:rPr lang="ko-KR" altLang="en-US" dirty="0"/>
-              <a:t>개 이상</a:t>
-            </a:r>
-            <a:r>
-              <a:rPr lang="en-US" altLang="ko-KR" dirty="0"/>
-              <a:t>)</a:t>
-            </a:r>
-          </a:p>
-          <a:p>
-            <a:pPr marL="285750" indent="-285750">
-              <a:lnSpc>
-                <a:spcPct val="150000"/>
-              </a:lnSpc>
-              <a:buFont typeface="Arial" panose="020B0604020202020204" pitchFamily="34" charset="0"/>
-              <a:buChar char="•"/>
-            </a:pPr>
-            <a:r>
-              <a:rPr lang="en-US" altLang="ko-KR" dirty="0"/>
-              <a:t>Client</a:t>
-            </a:r>
-            <a:r>
-              <a:rPr lang="ko-KR" altLang="en-US" dirty="0"/>
-              <a:t>는 </a:t>
-            </a:r>
-            <a:r>
-              <a:rPr lang="en-US" altLang="ko-KR" dirty="0"/>
-              <a:t>window </a:t>
-            </a:r>
-            <a:r>
-              <a:rPr lang="ko-KR" altLang="en-US" dirty="0"/>
-              <a:t>혹은 </a:t>
-            </a:r>
-            <a:r>
-              <a:rPr lang="en-US" altLang="ko-KR" dirty="0" err="1"/>
-              <a:t>linux</a:t>
-            </a:r>
-            <a:r>
-              <a:rPr lang="ko-KR" altLang="en-US" dirty="0"/>
-              <a:t> 콘솔 기반의 </a:t>
-            </a:r>
-            <a:r>
-              <a:rPr lang="en-US" altLang="ko-KR" dirty="0"/>
-              <a:t>C/C++</a:t>
-            </a:r>
-            <a:r>
-              <a:rPr lang="ko-KR" altLang="en-US" dirty="0"/>
-              <a:t>로 만들고 서버는 웹으로 제작하여 채팅 프로그램을 구현하라</a:t>
-            </a:r>
-            <a:r>
-              <a:rPr lang="en-US" altLang="ko-KR" dirty="0"/>
-              <a:t>.</a:t>
-            </a:r>
-          </a:p>
-          <a:p>
-            <a:pPr marL="285750" indent="-285750">
-              <a:lnSpc>
-                <a:spcPct val="150000"/>
-              </a:lnSpc>
-              <a:buFont typeface="Arial" panose="020B0604020202020204" pitchFamily="34" charset="0"/>
-              <a:buChar char="•"/>
-            </a:pPr>
-            <a:r>
-              <a:rPr lang="ko-KR" altLang="en-US" dirty="0"/>
-              <a:t>표준 </a:t>
-            </a:r>
-            <a:r>
-              <a:rPr lang="en-US" altLang="ko-KR" dirty="0"/>
-              <a:t>C/C++ </a:t>
-            </a:r>
-            <a:r>
-              <a:rPr lang="ko-KR" altLang="en-US" dirty="0"/>
-              <a:t>코드를 웹페이지에서 편집하고 저장 후 빌드 및 실행한 다음 결과값이 웹페이지에 출력되도록 하라</a:t>
-            </a:r>
-            <a:r>
-              <a:rPr lang="en-US" altLang="ko-KR" dirty="0"/>
-              <a:t>.</a:t>
-            </a:r>
-          </a:p>
-          <a:p>
-            <a:pPr marL="285750" indent="-285750">
-              <a:lnSpc>
-                <a:spcPct val="150000"/>
-              </a:lnSpc>
-              <a:buFont typeface="Arial" panose="020B0604020202020204" pitchFamily="34" charset="0"/>
-              <a:buChar char="•"/>
-            </a:pPr>
-            <a:r>
-              <a:rPr lang="ko-KR" altLang="en-US" dirty="0" err="1"/>
-              <a:t>해밍코드를</a:t>
-            </a:r>
-            <a:r>
-              <a:rPr lang="ko-KR" altLang="en-US" dirty="0"/>
-              <a:t> 프로그래밍 언어로 표현하라</a:t>
-            </a:r>
-            <a:r>
-              <a:rPr lang="en-US" altLang="ko-KR" dirty="0"/>
-              <a:t>.(C/C++)</a:t>
-            </a:r>
-          </a:p>
-          <a:p>
-            <a:pPr marL="285750" indent="-285750">
-              <a:lnSpc>
-                <a:spcPct val="150000"/>
-              </a:lnSpc>
-              <a:buFont typeface="Arial" panose="020B0604020202020204" pitchFamily="34" charset="0"/>
-              <a:buChar char="•"/>
-            </a:pPr>
-            <a:r>
-              <a:rPr lang="en-US" altLang="ko-KR" dirty="0" err="1"/>
-              <a:t>Ffmpeg</a:t>
-            </a:r>
-            <a:r>
-              <a:rPr lang="ko-KR" altLang="en-US" dirty="0"/>
-              <a:t>를 이용하여 </a:t>
-            </a:r>
-            <a:r>
-              <a:rPr lang="en-US" altLang="ko-KR" dirty="0" err="1"/>
-              <a:t>VideoLan</a:t>
-            </a:r>
-            <a:r>
-              <a:rPr lang="ko-KR" altLang="en-US" dirty="0"/>
-              <a:t>으로 스트리밍이 되는 것 제작 후 세미나</a:t>
-            </a:r>
-            <a:r>
-              <a:rPr lang="en-US" altLang="ko-KR" dirty="0"/>
-              <a:t>.</a:t>
-            </a:r>
-          </a:p>
-          <a:p>
-            <a:pPr marL="285750" indent="-285750">
-              <a:lnSpc>
-                <a:spcPct val="150000"/>
-              </a:lnSpc>
-              <a:buFont typeface="Arial" panose="020B0604020202020204" pitchFamily="34" charset="0"/>
-              <a:buChar char="•"/>
-            </a:pPr>
-            <a:r>
-              <a:rPr lang="en-US" altLang="ko-KR" dirty="0"/>
-              <a:t>Toolchain configuration boost, </a:t>
-            </a:r>
-            <a:r>
-              <a:rPr lang="en-US" altLang="ko-KR" dirty="0" err="1"/>
-              <a:t>cpp_redis</a:t>
-            </a:r>
-            <a:endParaRPr lang="en-US" altLang="ko-KR" dirty="0"/>
-          </a:p>
-        </p:txBody>
-      </p:sp>
-      <p:sp>
-        <p:nvSpPr>
-          <p:cNvPr id="3" name="직사각형 2">
-            <a:extLst>
-              <a:ext uri="{FF2B5EF4-FFF2-40B4-BE49-F238E27FC236}">
-                <a16:creationId xmlns:a16="http://schemas.microsoft.com/office/drawing/2014/main" id="{D3D94F08-975C-4538-B2FF-648945684DFA}"/>
-              </a:ext>
-            </a:extLst>
-          </p:cNvPr>
-          <p:cNvSpPr/>
-          <p:nvPr/>
-        </p:nvSpPr>
-        <p:spPr>
-          <a:xfrm>
-            <a:off x="1652954" y="1103140"/>
-            <a:ext cx="8718442" cy="1745568"/>
-          </a:xfrm>
-          <a:prstGeom prst="rect">
-            <a:avLst/>
-          </a:prstGeom>
-          <a:noFill/>
-          <a:ln w="57150">
-            <a:solidFill>
-              <a:srgbClr val="FF0000"/>
-            </a:solidFill>
-          </a:ln>
-        </p:spPr>
-        <p:style>
-          <a:lnRef idx="2">
-            <a:schemeClr val="accent1">
-              <a:shade val="50000"/>
-            </a:schemeClr>
-          </a:lnRef>
-          <a:fillRef idx="1">
-            <a:schemeClr val="accent1"/>
-          </a:fillRef>
-          <a:effectRef idx="0">
-            <a:schemeClr val="accent1"/>
-          </a:effectRef>
-          <a:fontRef idx="minor">
-            <a:schemeClr val="lt1"/>
-          </a:fontRef>
-        </p:style>
-        <p:txBody>
-          <a:bodyPr rtlCol="0" anchor="ctr"/>
-          <a:lstStyle/>
-          <a:p>
-            <a:pPr algn="ctr"/>
-            <a:endParaRPr lang="ko-KR" altLang="en-US"/>
           </a:p>
         </p:txBody>
       </p:sp>
@@ -4212,59 +4192,6 @@
                       </p:childTnLst>
                     </p:cTn>
                   </p:par>
-                  <p:par>
-                    <p:cTn id="8" fill="hold">
-                      <p:stCondLst>
-                        <p:cond delay="indefinite"/>
-                      </p:stCondLst>
-                      <p:childTnLst>
-                        <p:par>
-                          <p:cTn id="9" fill="hold">
-                            <p:stCondLst>
-                              <p:cond delay="0"/>
-                            </p:stCondLst>
-                            <p:childTnLst>
-                              <p:par>
-                                <p:cTn id="10" presetID="10" presetClass="entr" presetSubtype="0" fill="hold" grpId="0" nodeType="clickEffect">
-                                  <p:stCondLst>
-                                    <p:cond delay="0"/>
-                                  </p:stCondLst>
-                                  <p:childTnLst>
-                                    <p:set>
-                                      <p:cBhvr>
-                                        <p:cTn id="11" dur="1" fill="hold">
-                                          <p:stCondLst>
-                                            <p:cond delay="0"/>
-                                          </p:stCondLst>
-                                        </p:cTn>
-                                        <p:tgtEl>
-                                          <p:spTgt spid="3"/>
-                                        </p:tgtEl>
-                                        <p:attrNameLst>
-                                          <p:attrName>style.visibility</p:attrName>
-                                        </p:attrNameLst>
-                                      </p:cBhvr>
-                                      <p:to>
-                                        <p:strVal val="visible"/>
-                                      </p:to>
-                                    </p:set>
-                                    <p:animEffect transition="in" filter="fade">
-                                      <p:cBhvr>
-                                        <p:cTn id="12" dur="500"/>
-                                        <p:tgtEl>
-                                          <p:spTgt spid="3"/>
-                                        </p:tgtEl>
-                                      </p:cBhvr>
-                                    </p:animEffect>
-                                  </p:childTnLst>
-                                </p:cTn>
-                              </p:par>
-                            </p:childTnLst>
-                          </p:cTn>
-                        </p:par>
-                      </p:childTnLst>
-                    </p:cTn>
-                  </p:par>
                 </p:childTnLst>
               </p:cTn>
               <p:prevCondLst>
@@ -4288,7 +4215,6 @@
     </p:tnLst>
     <p:bldLst>
       <p:bldP spid="2" grpId="0"/>
-      <p:bldP spid="3" grpId="0" animBg="1"/>
     </p:bldLst>
   </p:timing>
 </p:sld>

</xml_diff>

<commit_message>
[mod] Chatting (Webssocket[tcp], socket[udp]) nodejs, c
</commit_message>
<xml_diff>
--- a/TheorySeminar/16. Detail Mission.pptx
+++ b/TheorySeminar/16. Detail Mission.pptx
@@ -198,7 +198,7 @@
           <a:p>
             <a:fld id="{8DD9E706-E0BA-4FBD-AF15-9E3682821587}" type="datetimeFigureOut">
               <a:rPr lang="ko-KR" altLang="en-US" smtClean="0"/>
-              <a:t>2019-01-15</a:t>
+              <a:t>2019-01-20</a:t>
             </a:fld>
             <a:endParaRPr lang="ko-KR" altLang="en-US"/>
           </a:p>
@@ -775,7 +775,7 @@
           <a:p>
             <a:fld id="{46A2558D-9475-4DD4-8F32-96381613298F}" type="datetimeFigureOut">
               <a:rPr lang="ko-KR" altLang="en-US" smtClean="0"/>
-              <a:t>2019-01-15</a:t>
+              <a:t>2019-01-20</a:t>
             </a:fld>
             <a:endParaRPr lang="ko-KR" altLang="en-US"/>
           </a:p>
@@ -945,7 +945,7 @@
           <a:p>
             <a:fld id="{46A2558D-9475-4DD4-8F32-96381613298F}" type="datetimeFigureOut">
               <a:rPr lang="ko-KR" altLang="en-US" smtClean="0"/>
-              <a:t>2019-01-15</a:t>
+              <a:t>2019-01-20</a:t>
             </a:fld>
             <a:endParaRPr lang="ko-KR" altLang="en-US"/>
           </a:p>
@@ -1125,7 +1125,7 @@
           <a:p>
             <a:fld id="{46A2558D-9475-4DD4-8F32-96381613298F}" type="datetimeFigureOut">
               <a:rPr lang="ko-KR" altLang="en-US" smtClean="0"/>
-              <a:t>2019-01-15</a:t>
+              <a:t>2019-01-20</a:t>
             </a:fld>
             <a:endParaRPr lang="ko-KR" altLang="en-US"/>
           </a:p>
@@ -1295,7 +1295,7 @@
           <a:p>
             <a:fld id="{46A2558D-9475-4DD4-8F32-96381613298F}" type="datetimeFigureOut">
               <a:rPr lang="ko-KR" altLang="en-US" smtClean="0"/>
-              <a:t>2019-01-15</a:t>
+              <a:t>2019-01-20</a:t>
             </a:fld>
             <a:endParaRPr lang="ko-KR" altLang="en-US"/>
           </a:p>
@@ -1541,7 +1541,7 @@
           <a:p>
             <a:fld id="{46A2558D-9475-4DD4-8F32-96381613298F}" type="datetimeFigureOut">
               <a:rPr lang="ko-KR" altLang="en-US" smtClean="0"/>
-              <a:t>2019-01-15</a:t>
+              <a:t>2019-01-20</a:t>
             </a:fld>
             <a:endParaRPr lang="ko-KR" altLang="en-US"/>
           </a:p>
@@ -1773,7 +1773,7 @@
           <a:p>
             <a:fld id="{46A2558D-9475-4DD4-8F32-96381613298F}" type="datetimeFigureOut">
               <a:rPr lang="ko-KR" altLang="en-US" smtClean="0"/>
-              <a:t>2019-01-15</a:t>
+              <a:t>2019-01-20</a:t>
             </a:fld>
             <a:endParaRPr lang="ko-KR" altLang="en-US"/>
           </a:p>
@@ -2140,7 +2140,7 @@
           <a:p>
             <a:fld id="{46A2558D-9475-4DD4-8F32-96381613298F}" type="datetimeFigureOut">
               <a:rPr lang="ko-KR" altLang="en-US" smtClean="0"/>
-              <a:t>2019-01-15</a:t>
+              <a:t>2019-01-20</a:t>
             </a:fld>
             <a:endParaRPr lang="ko-KR" altLang="en-US"/>
           </a:p>
@@ -2258,7 +2258,7 @@
           <a:p>
             <a:fld id="{46A2558D-9475-4DD4-8F32-96381613298F}" type="datetimeFigureOut">
               <a:rPr lang="ko-KR" altLang="en-US" smtClean="0"/>
-              <a:t>2019-01-15</a:t>
+              <a:t>2019-01-20</a:t>
             </a:fld>
             <a:endParaRPr lang="ko-KR" altLang="en-US"/>
           </a:p>
@@ -2353,7 +2353,7 @@
           <a:p>
             <a:fld id="{46A2558D-9475-4DD4-8F32-96381613298F}" type="datetimeFigureOut">
               <a:rPr lang="ko-KR" altLang="en-US" smtClean="0"/>
-              <a:t>2019-01-15</a:t>
+              <a:t>2019-01-20</a:t>
             </a:fld>
             <a:endParaRPr lang="ko-KR" altLang="en-US"/>
           </a:p>
@@ -2630,7 +2630,7 @@
           <a:p>
             <a:fld id="{46A2558D-9475-4DD4-8F32-96381613298F}" type="datetimeFigureOut">
               <a:rPr lang="ko-KR" altLang="en-US" smtClean="0"/>
-              <a:t>2019-01-15</a:t>
+              <a:t>2019-01-20</a:t>
             </a:fld>
             <a:endParaRPr lang="ko-KR" altLang="en-US"/>
           </a:p>
@@ -2887,7 +2887,7 @@
           <a:p>
             <a:fld id="{46A2558D-9475-4DD4-8F32-96381613298F}" type="datetimeFigureOut">
               <a:rPr lang="ko-KR" altLang="en-US" smtClean="0"/>
-              <a:t>2019-01-15</a:t>
+              <a:t>2019-01-20</a:t>
             </a:fld>
             <a:endParaRPr lang="ko-KR" altLang="en-US"/>
           </a:p>
@@ -3100,7 +3100,7 @@
           <a:p>
             <a:fld id="{46A2558D-9475-4DD4-8F32-96381613298F}" type="datetimeFigureOut">
               <a:rPr lang="ko-KR" altLang="en-US" smtClean="0"/>
-              <a:t>2019-01-15</a:t>
+              <a:t>2019-01-20</a:t>
             </a:fld>
             <a:endParaRPr lang="ko-KR" altLang="en-US"/>
           </a:p>
@@ -3767,7 +3767,7 @@
         <p:spPr>
           <a:xfrm>
             <a:off x="1761989" y="1103140"/>
-            <a:ext cx="9268287" cy="5450851"/>
+            <a:ext cx="9268287" cy="5035353"/>
           </a:xfrm>
           <a:prstGeom prst="rect">
             <a:avLst/>
@@ -3938,7 +3938,67 @@
                 <a:spcPct val="150000"/>
               </a:lnSpc>
               <a:buClr>
-                <a:srgbClr val="FF0000"/>
+                <a:srgbClr val="00B050"/>
+              </a:buClr>
+              <a:buFont typeface="Wingdings" panose="05000000000000000000" pitchFamily="2" charset="2"/>
+              <a:buChar char="ü"/>
+            </a:pPr>
+            <a:r>
+              <a:rPr lang="ko-KR" altLang="en-US" dirty="0"/>
+              <a:t>표준 </a:t>
+            </a:r>
+            <a:r>
+              <a:rPr lang="en-US" altLang="ko-KR" dirty="0"/>
+              <a:t>C/C++ </a:t>
+            </a:r>
+            <a:r>
+              <a:rPr lang="ko-KR" altLang="en-US" dirty="0"/>
+              <a:t>코드를 웹페이지에서 편집하고 저장 후 빌드 및 실행한 다음 결과값이 웹페이지에 출력되도록 하라</a:t>
+            </a:r>
+            <a:r>
+              <a:rPr lang="en-US" altLang="ko-KR" dirty="0"/>
+              <a:t>.</a:t>
+            </a:r>
+          </a:p>
+          <a:p>
+            <a:pPr marL="285750" indent="-285750">
+              <a:lnSpc>
+                <a:spcPct val="150000"/>
+              </a:lnSpc>
+              <a:buClr>
+                <a:srgbClr val="00B050"/>
+              </a:buClr>
+              <a:buFont typeface="Wingdings" panose="05000000000000000000" pitchFamily="2" charset="2"/>
+              <a:buChar char="ü"/>
+            </a:pPr>
+            <a:r>
+              <a:rPr lang="en-US" altLang="ko-KR" dirty="0" err="1"/>
+              <a:t>Ffmpeg</a:t>
+            </a:r>
+            <a:r>
+              <a:rPr lang="ko-KR" altLang="en-US" dirty="0"/>
+              <a:t>를 이용하여 </a:t>
+            </a:r>
+            <a:r>
+              <a:rPr lang="en-US" altLang="ko-KR" dirty="0" err="1"/>
+              <a:t>VideoLan</a:t>
+            </a:r>
+            <a:r>
+              <a:rPr lang="ko-KR" altLang="en-US" dirty="0"/>
+              <a:t>으로 스트리밍이 되는 것 제작 후 세미나</a:t>
+            </a:r>
+            <a:r>
+              <a:rPr lang="en-US" altLang="ko-KR" dirty="0"/>
+              <a:t>.</a:t>
+            </a:r>
+          </a:p>
+          <a:p>
+            <a:pPr marL="285750" indent="-285750">
+              <a:lnSpc>
+                <a:spcPct val="150000"/>
+              </a:lnSpc>
+              <a:buClr>
+                <a:srgbClr val="00B050"/>
               </a:buClr>
               <a:buFont typeface="Wingdings" panose="05000000000000000000" pitchFamily="2" charset="2"/>
               <a:buChar char="ü"/>
@@ -3976,20 +4036,16 @@
               <a:buChar char="ü"/>
             </a:pPr>
             <a:r>
+              <a:rPr lang="ko-KR" altLang="en-US" dirty="0" err="1"/>
+              <a:t>해밍코드를</a:t>
+            </a:r>
+            <a:r>
               <a:rPr lang="ko-KR" altLang="en-US" dirty="0"/>
-              <a:t>표준 </a:t>
+              <a:t> 프로그래밍 언어로 표현하라</a:t>
             </a:r>
             <a:r>
               <a:rPr lang="en-US" altLang="ko-KR" dirty="0"/>
-              <a:t>C/C++ </a:t>
-            </a:r>
-            <a:r>
-              <a:rPr lang="ko-KR" altLang="en-US" dirty="0"/>
-              <a:t>코드를 웹페이지에서 편집하고 저장 후 빌드 및 실행한 다음 결과값이 웹페이지에 출력되도록 하라</a:t>
-            </a:r>
-            <a:r>
-              <a:rPr lang="en-US" altLang="ko-KR" dirty="0"/>
-              <a:t>.</a:t>
+              <a:t>.(C/C++)</a:t>
             </a:r>
           </a:p>
           <a:p>
@@ -4004,48 +4060,40 @@
               <a:buChar char="ü"/>
             </a:pPr>
             <a:r>
+              <a:rPr lang="en-US" altLang="ko-KR" dirty="0"/>
+              <a:t>Client</a:t>
+            </a:r>
+            <a:r>
+              <a:rPr lang="ko-KR" altLang="en-US" dirty="0"/>
+              <a:t>는 </a:t>
+            </a:r>
+            <a:r>
+              <a:rPr lang="en-US" altLang="ko-KR" dirty="0"/>
+              <a:t>window </a:t>
+            </a:r>
+            <a:r>
+              <a:rPr lang="ko-KR" altLang="en-US" dirty="0"/>
+              <a:t>혹은 </a:t>
+            </a:r>
+            <a:r>
               <a:rPr lang="en-US" altLang="ko-KR" dirty="0" err="1"/>
-              <a:t>Ffmpeg</a:t>
+              <a:t>linux</a:t>
             </a:r>
             <a:r>
               <a:rPr lang="ko-KR" altLang="en-US" dirty="0"/>
-              <a:t>를 이용하여 </a:t>
-            </a:r>
-            <a:r>
-              <a:rPr lang="en-US" altLang="ko-KR" dirty="0" err="1"/>
-              <a:t>VideoLan</a:t>
+              <a:t> 콘솔 기반의 </a:t>
+            </a:r>
+            <a:r>
+              <a:rPr lang="en-US" altLang="ko-KR" dirty="0"/>
+              <a:t>C/C++</a:t>
             </a:r>
             <a:r>
               <a:rPr lang="ko-KR" altLang="en-US" dirty="0"/>
-              <a:t>으로 스트리밍이 되는 것 제작 후 세미나</a:t>
+              <a:t>로 만들고 서버는 웹으로 제작하여 채팅 프로그램을 구현하라</a:t>
             </a:r>
             <a:r>
               <a:rPr lang="en-US" altLang="ko-KR" dirty="0"/>
               <a:t>.</a:t>
-            </a:r>
-          </a:p>
-          <a:p>
-            <a:pPr marL="285750" indent="-285750">
-              <a:lnSpc>
-                <a:spcPct val="150000"/>
-              </a:lnSpc>
-              <a:buClr>
-                <a:srgbClr val="FF0000"/>
-              </a:buClr>
-              <a:buFont typeface="Wingdings" panose="05000000000000000000" pitchFamily="2" charset="2"/>
-              <a:buChar char="ü"/>
-            </a:pPr>
-            <a:r>
-              <a:rPr lang="ko-KR" altLang="en-US" dirty="0" err="1"/>
-              <a:t>해밍코드를</a:t>
-            </a:r>
-            <a:r>
-              <a:rPr lang="ko-KR" altLang="en-US" dirty="0"/>
-              <a:t> 프로그래밍 언어로 표현하라</a:t>
-            </a:r>
-            <a:r>
-              <a:rPr lang="en-US" altLang="ko-KR" dirty="0"/>
-              <a:t>.(C/C++)</a:t>
             </a:r>
           </a:p>
           <a:p>
@@ -4064,59 +4112,6 @@
               <a:rPr lang="en-US" altLang="ko-KR" dirty="0" err="1"/>
               <a:t>cpp_redis</a:t>
             </a:r>
-            <a:endParaRPr lang="en-US" altLang="ko-KR" dirty="0"/>
-          </a:p>
-          <a:p>
-            <a:pPr marL="285750" indent="-285750">
-              <a:lnSpc>
-                <a:spcPct val="150000"/>
-              </a:lnSpc>
-              <a:buFont typeface="Arial" panose="020B0604020202020204" pitchFamily="34" charset="0"/>
-              <a:buChar char="•"/>
-            </a:pPr>
-            <a:r>
-              <a:rPr lang="en-US" altLang="ko-KR" dirty="0"/>
-              <a:t>Client</a:t>
-            </a:r>
-            <a:r>
-              <a:rPr lang="ko-KR" altLang="en-US" dirty="0"/>
-              <a:t>는 </a:t>
-            </a:r>
-            <a:r>
-              <a:rPr lang="en-US" altLang="ko-KR" dirty="0"/>
-              <a:t>window </a:t>
-            </a:r>
-            <a:r>
-              <a:rPr lang="ko-KR" altLang="en-US" dirty="0"/>
-              <a:t>혹은 </a:t>
-            </a:r>
-            <a:r>
-              <a:rPr lang="en-US" altLang="ko-KR" dirty="0" err="1"/>
-              <a:t>linux</a:t>
-            </a:r>
-            <a:r>
-              <a:rPr lang="ko-KR" altLang="en-US" dirty="0"/>
-              <a:t> 콘솔 기반의 </a:t>
-            </a:r>
-            <a:r>
-              <a:rPr lang="en-US" altLang="ko-KR" dirty="0"/>
-              <a:t>C/C++</a:t>
-            </a:r>
-            <a:r>
-              <a:rPr lang="ko-KR" altLang="en-US" dirty="0"/>
-              <a:t>로 만들고 서버는 웹으로 제작하여 채팅 프로그램을 구현하라</a:t>
-            </a:r>
-            <a:r>
-              <a:rPr lang="en-US" altLang="ko-KR" dirty="0"/>
-              <a:t>.</a:t>
-            </a:r>
-          </a:p>
-          <a:p>
-            <a:pPr>
-              <a:lnSpc>
-                <a:spcPct val="150000"/>
-              </a:lnSpc>
-            </a:pPr>
             <a:endParaRPr lang="en-US" altLang="ko-KR" dirty="0"/>
           </a:p>
         </p:txBody>

</xml_diff>